<commit_message>
Added link for pitch video
</commit_message>
<xml_diff>
--- a/Documents/Game Ideas.pptx
+++ b/Documents/Game Ideas.pptx
@@ -11,6 +11,7 @@
     <p:sldId id="259" r:id="rId5"/>
     <p:sldId id="260" r:id="rId6"/>
     <p:sldId id="261" r:id="rId7"/>
+    <p:sldId id="262" r:id="rId8"/>
   </p:sldIdLst>
   <p:sldSz cx="12192000" cy="6858000"/>
   <p:notesSz cx="6858000" cy="9144000"/>
@@ -109,6 +110,11 @@
       </a:defRPr>
     </a:lvl9pPr>
   </p:defaultTextStyle>
+  <p:extLst>
+    <p:ext uri="{EFAFB233-063F-42B5-8137-9DF3F51BA10A}">
+      <p15:sldGuideLst xmlns:p15="http://schemas.microsoft.com/office/powerpoint/2012/main"/>
+    </p:ext>
+  </p:extLst>
 </p:presentation>
 </file>
 
@@ -268,7 +274,7 @@
           <a:p>
             <a:fld id="{02AC24A9-CCB6-4F8D-B8DB-C2F3692CFA5A}" type="datetimeFigureOut">
               <a:rPr lang="en-US" smtClean="0"/>
-              <a:t>1/9/2025</a:t>
+              <a:t>1/10/2025</a:t>
             </a:fld>
             <a:endParaRPr lang="en-US" dirty="0"/>
           </a:p>
@@ -638,7 +644,7 @@
           <a:p>
             <a:fld id="{02AC24A9-CCB6-4F8D-B8DB-C2F3692CFA5A}" type="datetimeFigureOut">
               <a:rPr lang="en-US" smtClean="0"/>
-              <a:t>1/9/2025</a:t>
+              <a:t>1/10/2025</a:t>
             </a:fld>
             <a:endParaRPr lang="en-US"/>
           </a:p>
@@ -847,7 +853,7 @@
           <a:p>
             <a:fld id="{02AC24A9-CCB6-4F8D-B8DB-C2F3692CFA5A}" type="datetimeFigureOut">
               <a:rPr lang="en-US" smtClean="0"/>
-              <a:t>1/9/2025</a:t>
+              <a:t>1/10/2025</a:t>
             </a:fld>
             <a:endParaRPr lang="en-US"/>
           </a:p>
@@ -1317,7 +1323,7 @@
           <a:p>
             <a:fld id="{02AC24A9-CCB6-4F8D-B8DB-C2F3692CFA5A}" type="datetimeFigureOut">
               <a:rPr lang="en-US" smtClean="0"/>
-              <a:t>1/9/2025</a:t>
+              <a:t>1/10/2025</a:t>
             </a:fld>
             <a:endParaRPr lang="en-US"/>
           </a:p>
@@ -1771,7 +1777,7 @@
           <a:p>
             <a:fld id="{02AC24A9-CCB6-4F8D-B8DB-C2F3692CFA5A}" type="datetimeFigureOut">
               <a:rPr lang="en-US" smtClean="0"/>
-              <a:t>1/9/2025</a:t>
+              <a:t>1/10/2025</a:t>
             </a:fld>
             <a:endParaRPr lang="en-US"/>
           </a:p>
@@ -2303,7 +2309,7 @@
           <a:p>
             <a:fld id="{02AC24A9-CCB6-4F8D-B8DB-C2F3692CFA5A}" type="datetimeFigureOut">
               <a:rPr lang="en-US" smtClean="0"/>
-              <a:t>1/9/2025</a:t>
+              <a:t>1/10/2025</a:t>
             </a:fld>
             <a:endParaRPr lang="en-US"/>
           </a:p>
@@ -3002,7 +3008,7 @@
           <a:p>
             <a:fld id="{02AC24A9-CCB6-4F8D-B8DB-C2F3692CFA5A}" type="datetimeFigureOut">
               <a:rPr lang="en-US" smtClean="0"/>
-              <a:t>1/9/2025</a:t>
+              <a:t>1/10/2025</a:t>
             </a:fld>
             <a:endParaRPr lang="en-US"/>
           </a:p>
@@ -3331,7 +3337,7 @@
           <a:p>
             <a:fld id="{02AC24A9-CCB6-4F8D-B8DB-C2F3692CFA5A}" type="datetimeFigureOut">
               <a:rPr lang="en-US" smtClean="0"/>
-              <a:t>1/9/2025</a:t>
+              <a:t>1/10/2025</a:t>
             </a:fld>
             <a:endParaRPr lang="en-US"/>
           </a:p>
@@ -3444,7 +3450,7 @@
           <a:p>
             <a:fld id="{02AC24A9-CCB6-4F8D-B8DB-C2F3692CFA5A}" type="datetimeFigureOut">
               <a:rPr lang="en-US" smtClean="0"/>
-              <a:t>1/9/2025</a:t>
+              <a:t>1/10/2025</a:t>
             </a:fld>
             <a:endParaRPr lang="en-US"/>
           </a:p>
@@ -3939,7 +3945,7 @@
           <a:p>
             <a:fld id="{02AC24A9-CCB6-4F8D-B8DB-C2F3692CFA5A}" type="datetimeFigureOut">
               <a:rPr lang="en-US" smtClean="0"/>
-              <a:t>1/9/2025</a:t>
+              <a:t>1/10/2025</a:t>
             </a:fld>
             <a:endParaRPr lang="en-US" dirty="0"/>
           </a:p>
@@ -4416,7 +4422,7 @@
           <a:p>
             <a:fld id="{02AC24A9-CCB6-4F8D-B8DB-C2F3692CFA5A}" type="datetimeFigureOut">
               <a:rPr lang="en-US" smtClean="0"/>
-              <a:t>1/9/2025</a:t>
+              <a:t>1/10/2025</a:t>
             </a:fld>
             <a:endParaRPr lang="en-US"/>
           </a:p>
@@ -4659,7 +4665,7 @@
           <a:p>
             <a:fld id="{02AC24A9-CCB6-4F8D-B8DB-C2F3692CFA5A}" type="datetimeFigureOut">
               <a:rPr lang="en-US" smtClean="0"/>
-              <a:t>1/9/2025</a:t>
+              <a:t>1/10/2025</a:t>
             </a:fld>
             <a:endParaRPr lang="en-US"/>
           </a:p>
@@ -8964,6 +8970,92 @@
 </p:sld>
 </file>
 
+<file path=ppt/slides/slide7.xml><?xml version="1.0" encoding="utf-8"?>
+<p:sld xmlns:a="http://schemas.openxmlformats.org/drawingml/2006/main" xmlns:r="http://schemas.openxmlformats.org/officeDocument/2006/relationships" xmlns:p="http://schemas.openxmlformats.org/presentationml/2006/main">
+  <p:cSld>
+    <p:spTree>
+      <p:nvGrpSpPr>
+        <p:cNvPr id="1" name=""/>
+        <p:cNvGrpSpPr/>
+        <p:nvPr/>
+      </p:nvGrpSpPr>
+      <p:grpSpPr>
+        <a:xfrm>
+          <a:off x="0" y="0"/>
+          <a:ext cx="0" cy="0"/>
+          <a:chOff x="0" y="0"/>
+          <a:chExt cx="0" cy="0"/>
+        </a:xfrm>
+      </p:grpSpPr>
+      <p:sp>
+        <p:nvSpPr>
+          <p:cNvPr id="5" name="Title 4">
+            <a:extLst>
+              <a:ext uri="{FF2B5EF4-FFF2-40B4-BE49-F238E27FC236}">
+                <a16:creationId xmlns:a16="http://schemas.microsoft.com/office/drawing/2014/main" id="{4E543121-3379-121C-929F-4936DA054884}"/>
+              </a:ext>
+            </a:extLst>
+          </p:cNvPr>
+          <p:cNvSpPr>
+            <a:spLocks noGrp="1"/>
+          </p:cNvSpPr>
+          <p:nvPr>
+            <p:ph type="ctrTitle"/>
+          </p:nvPr>
+        </p:nvSpPr>
+        <p:spPr/>
+        <p:txBody>
+          <a:bodyPr/>
+          <a:lstStyle/>
+          <a:p>
+            <a:r>
+              <a:rPr lang="en-CA" dirty="0"/>
+              <a:t>Thank You</a:t>
+            </a:r>
+          </a:p>
+        </p:txBody>
+      </p:sp>
+      <p:sp>
+        <p:nvSpPr>
+          <p:cNvPr id="6" name="Subtitle 5">
+            <a:extLst>
+              <a:ext uri="{FF2B5EF4-FFF2-40B4-BE49-F238E27FC236}">
+                <a16:creationId xmlns:a16="http://schemas.microsoft.com/office/drawing/2014/main" id="{53361384-3CC5-97B7-3A6F-2EFF7AAF6B36}"/>
+              </a:ext>
+            </a:extLst>
+          </p:cNvPr>
+          <p:cNvSpPr>
+            <a:spLocks noGrp="1"/>
+          </p:cNvSpPr>
+          <p:nvPr>
+            <p:ph type="subTitle" idx="1"/>
+          </p:nvPr>
+        </p:nvSpPr>
+        <p:spPr/>
+        <p:txBody>
+          <a:bodyPr/>
+          <a:lstStyle/>
+          <a:p>
+            <a:r>
+              <a:rPr lang="en-CA" dirty="0"/>
+              <a:t>For Listening to my pitch</a:t>
+            </a:r>
+          </a:p>
+        </p:txBody>
+      </p:sp>
+    </p:spTree>
+    <p:extLst>
+      <p:ext uri="{BB962C8B-B14F-4D97-AF65-F5344CB8AC3E}">
+        <p14:creationId xmlns:p14="http://schemas.microsoft.com/office/powerpoint/2010/main" val="1373204311"/>
+      </p:ext>
+    </p:extLst>
+  </p:cSld>
+  <p:clrMapOvr>
+    <a:masterClrMapping/>
+  </p:clrMapOvr>
+</p:sld>
+</file>
+
 <file path=ppt/theme/theme1.xml><?xml version="1.0" encoding="utf-8"?>
 <a:theme xmlns:a="http://schemas.openxmlformats.org/drawingml/2006/main" name="AccentBoxVTI">
   <a:themeElements>

</xml_diff>